<commit_message>
editing MMR problem statement
</commit_message>
<xml_diff>
--- a/project/Final Presentation 112916.pptx
+++ b/project/Final Presentation 112916.pptx
@@ -215,7 +215,7 @@
           <a:p>
             <a:fld id="{58CF373E-48EE-4419-81F1-F7592575718D}" type="datetimeFigureOut">
               <a:rPr lang="en-US" smtClean="0"/>
-              <a:t>12/1/2016</a:t>
+              <a:t>1/17/2017</a:t>
             </a:fld>
             <a:endParaRPr lang="en-US"/>
           </a:p>
@@ -1285,7 +1285,7 @@
           <a:p>
             <a:fld id="{A0A75E8F-C24B-447D-96A1-31C42002591F}" type="datetime1">
               <a:rPr lang="en-US" smtClean="0"/>
-              <a:t>12/1/2016</a:t>
+              <a:t>1/17/2017</a:t>
             </a:fld>
             <a:endParaRPr lang="en-US"/>
           </a:p>
@@ -1462,7 +1462,7 @@
           <a:p>
             <a:fld id="{D04C51A1-517C-4859-8F2A-B2F9097A8FEF}" type="datetime1">
               <a:rPr lang="en-US" smtClean="0"/>
-              <a:t>12/1/2016</a:t>
+              <a:t>1/17/2017</a:t>
             </a:fld>
             <a:endParaRPr lang="en-US"/>
           </a:p>
@@ -1642,7 +1642,7 @@
           <a:p>
             <a:fld id="{E2AE8F77-5A50-4396-BB1F-33D5020DD64A}" type="datetime1">
               <a:rPr lang="en-US" smtClean="0"/>
-              <a:t>12/1/2016</a:t>
+              <a:t>1/17/2017</a:t>
             </a:fld>
             <a:endParaRPr lang="en-US"/>
           </a:p>
@@ -1812,7 +1812,7 @@
           <a:p>
             <a:fld id="{B1926425-3D45-42EB-8DB1-002CE5FB83F9}" type="datetime1">
               <a:rPr lang="en-US" smtClean="0"/>
-              <a:t>12/1/2016</a:t>
+              <a:t>1/17/2017</a:t>
             </a:fld>
             <a:endParaRPr lang="en-US"/>
           </a:p>
@@ -2065,7 +2065,7 @@
           <a:p>
             <a:fld id="{1B9216BA-A009-4F1F-9059-B8C1F6859737}" type="datetime1">
               <a:rPr lang="en-US" smtClean="0"/>
-              <a:t>12/1/2016</a:t>
+              <a:t>1/17/2017</a:t>
             </a:fld>
             <a:endParaRPr lang="en-US"/>
           </a:p>
@@ -2353,7 +2353,7 @@
           <a:p>
             <a:fld id="{051D6798-3E24-4777-9B1C-D7F80C1DF7E0}" type="datetime1">
               <a:rPr lang="en-US" smtClean="0"/>
-              <a:t>12/1/2016</a:t>
+              <a:t>1/17/2017</a:t>
             </a:fld>
             <a:endParaRPr lang="en-US"/>
           </a:p>
@@ -2775,7 +2775,7 @@
           <a:p>
             <a:fld id="{5E261A3F-8AF3-4F33-B322-D4E1187B22DA}" type="datetime1">
               <a:rPr lang="en-US" smtClean="0"/>
-              <a:t>12/1/2016</a:t>
+              <a:t>1/17/2017</a:t>
             </a:fld>
             <a:endParaRPr lang="en-US"/>
           </a:p>
@@ -2893,7 +2893,7 @@
           <a:p>
             <a:fld id="{2C158CFC-4140-49D0-80DF-E2C9573F7735}" type="datetime1">
               <a:rPr lang="en-US" smtClean="0"/>
-              <a:t>12/1/2016</a:t>
+              <a:t>1/17/2017</a:t>
             </a:fld>
             <a:endParaRPr lang="en-US"/>
           </a:p>
@@ -2988,7 +2988,7 @@
           <a:p>
             <a:fld id="{E75D8527-21D3-40E8-9385-80AA89544119}" type="datetime1">
               <a:rPr lang="en-US" smtClean="0"/>
-              <a:t>12/1/2016</a:t>
+              <a:t>1/17/2017</a:t>
             </a:fld>
             <a:endParaRPr lang="en-US"/>
           </a:p>
@@ -3265,7 +3265,7 @@
           <a:p>
             <a:fld id="{ACB2517E-4DB6-4375-9EEA-7D5D0BC0B040}" type="datetime1">
               <a:rPr lang="en-US" smtClean="0"/>
-              <a:t>12/1/2016</a:t>
+              <a:t>1/17/2017</a:t>
             </a:fld>
             <a:endParaRPr lang="en-US"/>
           </a:p>
@@ -3518,7 +3518,7 @@
           <a:p>
             <a:fld id="{35F480DC-3962-4FBE-A09A-2F32367D0F38}" type="datetime1">
               <a:rPr lang="en-US" smtClean="0"/>
-              <a:t>12/1/2016</a:t>
+              <a:t>1/17/2017</a:t>
             </a:fld>
             <a:endParaRPr lang="en-US"/>
           </a:p>
@@ -3731,7 +3731,7 @@
           <a:p>
             <a:fld id="{77224D1B-CF11-4DF7-9CDD-D0C9D30BD2A1}" type="datetime1">
               <a:rPr lang="en-US" smtClean="0"/>
-              <a:t>12/1/2016</a:t>
+              <a:t>1/17/2017</a:t>
             </a:fld>
             <a:endParaRPr lang="en-US"/>
           </a:p>
@@ -4526,7 +4526,16 @@
                 </a:solidFill>
                 <a:latin typeface="Helvetica Neue"/>
               </a:rPr>
-              <a:t>improve global maternal </a:t>
+              <a:t>decrease global </a:t>
+            </a:r>
+            <a:r>
+              <a:rPr lang="en-US" sz="2000" b="1" dirty="0" smtClean="0">
+                <a:solidFill>
+                  <a:schemeClr val="bg1"/>
+                </a:solidFill>
+                <a:latin typeface="Helvetica Neue"/>
+              </a:rPr>
+              <a:t>maternal </a:t>
             </a:r>
             <a:r>
               <a:rPr lang="en-US" sz="2000" b="1" dirty="0">
@@ -5247,12 +5256,12 @@
           <a:graphicData uri="http://schemas.openxmlformats.org/presentationml/2006/ole">
             <mc:AlternateContent xmlns:mc="http://schemas.openxmlformats.org/markup-compatibility/2006">
               <mc:Choice xmlns:v="urn:schemas-microsoft-com:vml" Requires="v">
-                <p:oleObj spid="_x0000_s2076" name="Worksheet" r:id="rId4" imgW="2029015" imgH="2105094" progId="Excel.Sheet.12">
+                <p:oleObj spid="_x0000_s2078" name="Worksheet" r:id="rId3" imgW="2029015" imgH="2105094" progId="Excel.Sheet.12">
                   <p:embed/>
                 </p:oleObj>
               </mc:Choice>
               <mc:Fallback>
-                <p:oleObj name="Worksheet" r:id="rId4" imgW="2029015" imgH="2105094" progId="Excel.Sheet.12">
+                <p:oleObj name="Worksheet" r:id="rId3" imgW="2029015" imgH="2105094" progId="Excel.Sheet.12">
                   <p:embed/>
                   <p:pic>
                     <p:nvPicPr>
@@ -5261,7 +5270,7 @@
                       <p:nvPr/>
                     </p:nvPicPr>
                     <p:blipFill>
-                      <a:blip r:embed="rId5"/>
+                      <a:blip r:embed="rId4"/>
                       <a:stretch>
                         <a:fillRect/>
                       </a:stretch>
@@ -5291,7 +5300,7 @@
           <p:nvPr/>
         </p:nvPicPr>
         <p:blipFill>
-          <a:blip r:embed="rId6">
+          <a:blip r:embed="rId5">
             <a:extLst>
               <a:ext uri="{28A0092B-C50C-407E-A947-70E740481C1C}">
                 <a14:useLocalDpi xmlns:a14="http://schemas.microsoft.com/office/drawing/2010/main" val="0"/>

</xml_diff>